<commit_message>
Created images folder and powerpoint presentation
</commit_message>
<xml_diff>
--- a/data/interest_rate.pptx
+++ b/data/interest_rate.pptx
@@ -7,7 +7,10 @@
   <p:sldIdLst>
     <p:sldId id="257" r:id="rId5"/>
     <p:sldId id="259" r:id="rId6"/>
-    <p:sldId id="258" r:id="rId7"/>
+    <p:sldId id="260" r:id="rId7"/>
+    <p:sldId id="261" r:id="rId8"/>
+    <p:sldId id="262" r:id="rId9"/>
+    <p:sldId id="258" r:id="rId10"/>
   </p:sldIdLst>
   <p:sldSz cx="12192000" cy="6858000"/>
   <p:notesSz cx="6858000" cy="9144000"/>
@@ -4086,7 +4089,10 @@
           <a:bodyPr/>
           <a:lstStyle/>
           <a:p>
-            <a:endParaRPr lang="en-US"/>
+            <a:r>
+              <a:rPr lang="en-US" dirty="0"/>
+              <a:t>Linear Regression Case Study</a:t>
+            </a:r>
           </a:p>
         </p:txBody>
       </p:sp>
@@ -4111,10 +4117,70 @@
           <a:bodyPr/>
           <a:lstStyle/>
           <a:p>
-            <a:endParaRPr lang="en-US"/>
-          </a:p>
-        </p:txBody>
-      </p:sp>
+            <a:pPr marL="0" indent="0">
+              <a:buNone/>
+            </a:pPr>
+            <a:r>
+              <a:rPr lang="en-US" dirty="0"/>
+              <a:t>(PROJECT GOAL) The dataset that the EDA was performed on was from a bank. The goal was to build a linear regression model to predict interest rates based on 'FICO score ranges' and assess how well the model generalizes to unseen data using cross-validation.</a:t>
+            </a:r>
+          </a:p>
+          <a:p>
+            <a:pPr marL="0" indent="0">
+              <a:buNone/>
+            </a:pPr>
+            <a:r>
+              <a:rPr lang="en-US" dirty="0"/>
+              <a:t>Null Hypothesis: There is no relationship between FICO scores and interest rates</a:t>
+            </a:r>
+          </a:p>
+          <a:p>
+            <a:pPr marL="0" indent="0">
+              <a:buNone/>
+            </a:pPr>
+            <a:r>
+              <a:rPr lang="en-US" dirty="0"/>
+              <a:t>Alternative Hypothesis: There is a relationship between FICO scores and interest rates</a:t>
+            </a:r>
+          </a:p>
+        </p:txBody>
+      </p:sp>
+      <p:pic>
+        <p:nvPicPr>
+          <p:cNvPr id="7" name="Picture 6" descr="Graphical user interface, application&#10;&#10;Description automatically generated">
+            <a:extLst>
+              <a:ext uri="{FF2B5EF4-FFF2-40B4-BE49-F238E27FC236}">
+                <a16:creationId xmlns:a16="http://schemas.microsoft.com/office/drawing/2014/main" id="{D807BAC2-C709-E26B-44BB-001A0BC52CB8}"/>
+              </a:ext>
+            </a:extLst>
+          </p:cNvPr>
+          <p:cNvPicPr>
+            <a:picLocks noChangeAspect="1"/>
+          </p:cNvPicPr>
+          <p:nvPr/>
+        </p:nvPicPr>
+        <p:blipFill>
+          <a:blip r:embed="rId2">
+            <a:extLst>
+              <a:ext uri="{28A0092B-C50C-407E-A947-70E740481C1C}">
+                <a14:useLocalDpi xmlns:a14="http://schemas.microsoft.com/office/drawing/2010/main" val="0"/>
+              </a:ext>
+            </a:extLst>
+          </a:blip>
+          <a:stretch>
+            <a:fillRect/>
+          </a:stretch>
+        </p:blipFill>
+        <p:spPr>
+          <a:xfrm>
+            <a:off x="3334527" y="4172803"/>
+            <a:ext cx="4601217" cy="1514686"/>
+          </a:xfrm>
+          <a:prstGeom prst="rect">
+            <a:avLst/>
+          </a:prstGeom>
+        </p:spPr>
+      </p:pic>
     </p:spTree>
     <p:extLst>
       <p:ext uri="{BB962C8B-B14F-4D97-AF65-F5344CB8AC3E}">
@@ -4129,6 +4195,601 @@
 </file>
 
 <file path=ppt/slides/slide3.xml><?xml version="1.0" encoding="utf-8"?>
+<p:sld xmlns:a="http://schemas.openxmlformats.org/drawingml/2006/main" xmlns:r="http://schemas.openxmlformats.org/officeDocument/2006/relationships" xmlns:p="http://schemas.openxmlformats.org/presentationml/2006/main">
+  <p:cSld>
+    <p:spTree>
+      <p:nvGrpSpPr>
+        <p:cNvPr id="1" name=""/>
+        <p:cNvGrpSpPr/>
+        <p:nvPr/>
+      </p:nvGrpSpPr>
+      <p:grpSpPr>
+        <a:xfrm>
+          <a:off x="0" y="0"/>
+          <a:ext cx="0" cy="0"/>
+          <a:chOff x="0" y="0"/>
+          <a:chExt cx="0" cy="0"/>
+        </a:xfrm>
+      </p:grpSpPr>
+      <p:sp>
+        <p:nvSpPr>
+          <p:cNvPr id="2" name="Title 1">
+            <a:extLst>
+              <a:ext uri="{FF2B5EF4-FFF2-40B4-BE49-F238E27FC236}">
+                <a16:creationId xmlns:a16="http://schemas.microsoft.com/office/drawing/2014/main" id="{ECEFC40D-61A4-5761-52DF-52A85CB99663}"/>
+              </a:ext>
+            </a:extLst>
+          </p:cNvPr>
+          <p:cNvSpPr>
+            <a:spLocks noGrp="1"/>
+          </p:cNvSpPr>
+          <p:nvPr>
+            <p:ph type="title"/>
+          </p:nvPr>
+        </p:nvSpPr>
+        <p:spPr/>
+        <p:txBody>
+          <a:bodyPr/>
+          <a:lstStyle/>
+          <a:p>
+            <a:pPr algn="ctr"/>
+            <a:r>
+              <a:rPr lang="en-US" dirty="0"/>
+              <a:t>Describe the Data</a:t>
+            </a:r>
+          </a:p>
+        </p:txBody>
+      </p:sp>
+      <p:sp>
+        <p:nvSpPr>
+          <p:cNvPr id="3" name="Content Placeholder 2">
+            <a:extLst>
+              <a:ext uri="{FF2B5EF4-FFF2-40B4-BE49-F238E27FC236}">
+                <a16:creationId xmlns:a16="http://schemas.microsoft.com/office/drawing/2014/main" id="{DBD804E5-4A82-D9E2-5D7F-A613182E5BFA}"/>
+              </a:ext>
+            </a:extLst>
+          </p:cNvPr>
+          <p:cNvSpPr>
+            <a:spLocks noGrp="1"/>
+          </p:cNvSpPr>
+          <p:nvPr>
+            <p:ph idx="1"/>
+          </p:nvPr>
+        </p:nvSpPr>
+        <p:spPr/>
+        <p:txBody>
+          <a:bodyPr/>
+          <a:lstStyle/>
+          <a:p>
+            <a:pPr>
+              <a:buFont typeface="Wingdings" panose="05000000000000000000" pitchFamily="2" charset="2"/>
+              <a:buChar char="Ø"/>
+            </a:pPr>
+            <a:r>
+              <a:rPr lang="en-US" dirty="0"/>
+              <a:t> The dataset comprised of 5 rows and 2498 columns</a:t>
+            </a:r>
+          </a:p>
+          <a:p>
+            <a:pPr>
+              <a:buFont typeface="Wingdings" panose="05000000000000000000" pitchFamily="2" charset="2"/>
+              <a:buChar char="Ø"/>
+            </a:pPr>
+            <a:r>
+              <a:rPr lang="en-US" dirty="0"/>
+              <a:t>Column names: Interest Rate, FICO Range, Amount Requested, Amount Funded by Investors, Loan Length. </a:t>
+            </a:r>
+          </a:p>
+          <a:p>
+            <a:pPr>
+              <a:buFont typeface="Wingdings" panose="05000000000000000000" pitchFamily="2" charset="2"/>
+              <a:buChar char="Ø"/>
+            </a:pPr>
+            <a:r>
+              <a:rPr lang="en-US" dirty="0"/>
+              <a:t>The target was the Interest Rates column</a:t>
+            </a:r>
+          </a:p>
+          <a:p>
+            <a:pPr>
+              <a:buFont typeface="Wingdings" panose="05000000000000000000" pitchFamily="2" charset="2"/>
+              <a:buChar char="Ø"/>
+            </a:pPr>
+            <a:r>
+              <a:rPr lang="en-US" dirty="0"/>
+              <a:t>Three features were used: FICO Range, Amount Funded by Investors and Loan Length. These were all numerical</a:t>
+            </a:r>
+          </a:p>
+          <a:p>
+            <a:pPr>
+              <a:buFont typeface="Wingdings" panose="05000000000000000000" pitchFamily="2" charset="2"/>
+              <a:buChar char="Ø"/>
+            </a:pPr>
+            <a:r>
+              <a:rPr lang="en-US" dirty="0"/>
+              <a:t>No data was missing. Categorized loan length in order to compare the alternate to the default. Loan length was separated into 2 different categories and compared with less entries to the category with more</a:t>
+            </a:r>
+          </a:p>
+          <a:p>
+            <a:pPr>
+              <a:buFont typeface="Wingdings" panose="05000000000000000000" pitchFamily="2" charset="2"/>
+              <a:buChar char="Ø"/>
+            </a:pPr>
+            <a:endParaRPr lang="en-US" dirty="0"/>
+          </a:p>
+          <a:p>
+            <a:pPr>
+              <a:buFont typeface="Wingdings" panose="05000000000000000000" pitchFamily="2" charset="2"/>
+              <a:buChar char="Ø"/>
+            </a:pPr>
+            <a:endParaRPr lang="en-US" dirty="0"/>
+          </a:p>
+          <a:p>
+            <a:pPr>
+              <a:buFont typeface="Wingdings" panose="05000000000000000000" pitchFamily="2" charset="2"/>
+              <a:buChar char="Ø"/>
+            </a:pPr>
+            <a:endParaRPr lang="en-US" dirty="0"/>
+          </a:p>
+        </p:txBody>
+      </p:sp>
+    </p:spTree>
+    <p:extLst>
+      <p:ext uri="{BB962C8B-B14F-4D97-AF65-F5344CB8AC3E}">
+        <p14:creationId xmlns:p14="http://schemas.microsoft.com/office/powerpoint/2010/main" val="2397637253"/>
+      </p:ext>
+    </p:extLst>
+  </p:cSld>
+  <p:clrMapOvr>
+    <a:masterClrMapping/>
+  </p:clrMapOvr>
+</p:sld>
+</file>
+
+<file path=ppt/slides/slide4.xml><?xml version="1.0" encoding="utf-8"?>
+<p:sld xmlns:a="http://schemas.openxmlformats.org/drawingml/2006/main" xmlns:r="http://schemas.openxmlformats.org/officeDocument/2006/relationships" xmlns:p="http://schemas.openxmlformats.org/presentationml/2006/main">
+  <p:cSld>
+    <p:spTree>
+      <p:nvGrpSpPr>
+        <p:cNvPr id="1" name=""/>
+        <p:cNvGrpSpPr/>
+        <p:nvPr/>
+      </p:nvGrpSpPr>
+      <p:grpSpPr>
+        <a:xfrm>
+          <a:off x="0" y="0"/>
+          <a:ext cx="0" cy="0"/>
+          <a:chOff x="0" y="0"/>
+          <a:chExt cx="0" cy="0"/>
+        </a:xfrm>
+      </p:grpSpPr>
+      <p:sp>
+        <p:nvSpPr>
+          <p:cNvPr id="2" name="Title 1">
+            <a:extLst>
+              <a:ext uri="{FF2B5EF4-FFF2-40B4-BE49-F238E27FC236}">
+                <a16:creationId xmlns:a16="http://schemas.microsoft.com/office/drawing/2014/main" id="{ECEFC40D-61A4-5761-52DF-52A85CB99663}"/>
+              </a:ext>
+            </a:extLst>
+          </p:cNvPr>
+          <p:cNvSpPr>
+            <a:spLocks noGrp="1"/>
+          </p:cNvSpPr>
+          <p:nvPr>
+            <p:ph type="title"/>
+          </p:nvPr>
+        </p:nvSpPr>
+        <p:spPr/>
+        <p:txBody>
+          <a:bodyPr/>
+          <a:lstStyle/>
+          <a:p>
+            <a:pPr algn="ctr"/>
+            <a:r>
+              <a:rPr lang="en-US" dirty="0"/>
+              <a:t>Describe the Data cont.</a:t>
+            </a:r>
+          </a:p>
+        </p:txBody>
+      </p:sp>
+      <p:sp>
+        <p:nvSpPr>
+          <p:cNvPr id="3" name="Content Placeholder 2">
+            <a:extLst>
+              <a:ext uri="{FF2B5EF4-FFF2-40B4-BE49-F238E27FC236}">
+                <a16:creationId xmlns:a16="http://schemas.microsoft.com/office/drawing/2014/main" id="{DBD804E5-4A82-D9E2-5D7F-A613182E5BFA}"/>
+              </a:ext>
+            </a:extLst>
+          </p:cNvPr>
+          <p:cNvSpPr>
+            <a:spLocks noGrp="1"/>
+          </p:cNvSpPr>
+          <p:nvPr>
+            <p:ph idx="1"/>
+          </p:nvPr>
+        </p:nvSpPr>
+        <p:spPr>
+          <a:xfrm>
+            <a:off x="1097280" y="2108202"/>
+            <a:ext cx="10058400" cy="863598"/>
+          </a:xfrm>
+        </p:spPr>
+        <p:txBody>
+          <a:bodyPr/>
+          <a:lstStyle/>
+          <a:p>
+            <a:pPr>
+              <a:buFont typeface="Wingdings" panose="05000000000000000000" pitchFamily="2" charset="2"/>
+              <a:buChar char="Ø"/>
+            </a:pPr>
+            <a:r>
+              <a:rPr lang="en-US" dirty="0"/>
+              <a:t> It was discovered that there were correlations with the FICO score and the interest rate based off our pair plot </a:t>
+            </a:r>
+          </a:p>
+          <a:p>
+            <a:pPr>
+              <a:buFont typeface="Wingdings" panose="05000000000000000000" pitchFamily="2" charset="2"/>
+              <a:buChar char="Ø"/>
+            </a:pPr>
+            <a:endParaRPr lang="en-US" dirty="0"/>
+          </a:p>
+          <a:p>
+            <a:pPr>
+              <a:buFont typeface="Wingdings" panose="05000000000000000000" pitchFamily="2" charset="2"/>
+              <a:buChar char="Ø"/>
+            </a:pPr>
+            <a:endParaRPr lang="en-US" dirty="0"/>
+          </a:p>
+        </p:txBody>
+      </p:sp>
+      <p:pic>
+        <p:nvPicPr>
+          <p:cNvPr id="5" name="Picture 4" descr="Chart, scatter chart&#10;&#10;Description automatically generated">
+            <a:extLst>
+              <a:ext uri="{FF2B5EF4-FFF2-40B4-BE49-F238E27FC236}">
+                <a16:creationId xmlns:a16="http://schemas.microsoft.com/office/drawing/2014/main" id="{589169D4-743A-8922-F9C2-FA5FA88B44C9}"/>
+              </a:ext>
+            </a:extLst>
+          </p:cNvPr>
+          <p:cNvPicPr>
+            <a:picLocks noChangeAspect="1"/>
+          </p:cNvPicPr>
+          <p:nvPr/>
+        </p:nvPicPr>
+        <p:blipFill>
+          <a:blip r:embed="rId2">
+            <a:extLst>
+              <a:ext uri="{28A0092B-C50C-407E-A947-70E740481C1C}">
+                <a14:useLocalDpi xmlns:a14="http://schemas.microsoft.com/office/drawing/2010/main" val="0"/>
+              </a:ext>
+            </a:extLst>
+          </a:blip>
+          <a:stretch>
+            <a:fillRect/>
+          </a:stretch>
+        </p:blipFill>
+        <p:spPr>
+          <a:xfrm>
+            <a:off x="938021" y="3500278"/>
+            <a:ext cx="2734057" cy="2276793"/>
+          </a:xfrm>
+          <a:prstGeom prst="rect">
+            <a:avLst/>
+          </a:prstGeom>
+        </p:spPr>
+      </p:pic>
+      <p:pic>
+        <p:nvPicPr>
+          <p:cNvPr id="7" name="Picture 6">
+            <a:extLst>
+              <a:ext uri="{FF2B5EF4-FFF2-40B4-BE49-F238E27FC236}">
+                <a16:creationId xmlns:a16="http://schemas.microsoft.com/office/drawing/2014/main" id="{627C0221-6FBE-E29A-4348-FC9FF5354859}"/>
+              </a:ext>
+            </a:extLst>
+          </p:cNvPr>
+          <p:cNvPicPr>
+            <a:picLocks noChangeAspect="1"/>
+          </p:cNvPicPr>
+          <p:nvPr/>
+        </p:nvPicPr>
+        <p:blipFill>
+          <a:blip r:embed="rId3">
+            <a:extLst>
+              <a:ext uri="{28A0092B-C50C-407E-A947-70E740481C1C}">
+                <a14:useLocalDpi xmlns:a14="http://schemas.microsoft.com/office/drawing/2010/main" val="0"/>
+              </a:ext>
+            </a:extLst>
+          </a:blip>
+          <a:stretch>
+            <a:fillRect/>
+          </a:stretch>
+        </p:blipFill>
+        <p:spPr>
+          <a:xfrm>
+            <a:off x="2016057" y="5764381"/>
+            <a:ext cx="971686" cy="190527"/>
+          </a:xfrm>
+          <a:prstGeom prst="rect">
+            <a:avLst/>
+          </a:prstGeom>
+        </p:spPr>
+      </p:pic>
+      <p:pic>
+        <p:nvPicPr>
+          <p:cNvPr id="10" name="Picture 9" descr="Chart, histogram&#10;&#10;Description automatically generated">
+            <a:extLst>
+              <a:ext uri="{FF2B5EF4-FFF2-40B4-BE49-F238E27FC236}">
+                <a16:creationId xmlns:a16="http://schemas.microsoft.com/office/drawing/2014/main" id="{27458BE3-EBB2-628B-A827-8F7C7083E7B9}"/>
+              </a:ext>
+            </a:extLst>
+          </p:cNvPr>
+          <p:cNvPicPr>
+            <a:picLocks noChangeAspect="1"/>
+          </p:cNvPicPr>
+          <p:nvPr/>
+        </p:nvPicPr>
+        <p:blipFill>
+          <a:blip r:embed="rId4">
+            <a:extLst>
+              <a:ext uri="{28A0092B-C50C-407E-A947-70E740481C1C}">
+                <a14:useLocalDpi xmlns:a14="http://schemas.microsoft.com/office/drawing/2010/main" val="0"/>
+              </a:ext>
+            </a:extLst>
+          </a:blip>
+          <a:stretch>
+            <a:fillRect/>
+          </a:stretch>
+        </p:blipFill>
+        <p:spPr>
+          <a:xfrm>
+            <a:off x="3819339" y="3462178"/>
+            <a:ext cx="2667372" cy="2648320"/>
+          </a:xfrm>
+          <a:prstGeom prst="rect">
+            <a:avLst/>
+          </a:prstGeom>
+        </p:spPr>
+      </p:pic>
+      <p:sp>
+        <p:nvSpPr>
+          <p:cNvPr id="11" name="TextBox 10">
+            <a:extLst>
+              <a:ext uri="{FF2B5EF4-FFF2-40B4-BE49-F238E27FC236}">
+                <a16:creationId xmlns:a16="http://schemas.microsoft.com/office/drawing/2014/main" id="{C9334416-61DF-5749-FA4C-E9E3722873E1}"/>
+              </a:ext>
+            </a:extLst>
+          </p:cNvPr>
+          <p:cNvSpPr txBox="1"/>
+          <p:nvPr/>
+        </p:nvSpPr>
+        <p:spPr>
+          <a:xfrm>
+            <a:off x="7448550" y="3462177"/>
+            <a:ext cx="3581400" cy="1200329"/>
+          </a:xfrm>
+          <a:prstGeom prst="rect">
+            <a:avLst/>
+          </a:prstGeom>
+          <a:noFill/>
+        </p:spPr>
+        <p:txBody>
+          <a:bodyPr wrap="square" rtlCol="0">
+            <a:spAutoFit/>
+          </a:bodyPr>
+          <a:lstStyle/>
+          <a:p>
+            <a:pPr marL="285750" indent="-285750">
+              <a:buFont typeface="Wingdings" panose="05000000000000000000" pitchFamily="2" charset="2"/>
+              <a:buChar char="Ø"/>
+            </a:pPr>
+            <a:r>
+              <a:rPr lang="en-US" dirty="0"/>
+              <a:t>Through our analysis there was no correlation observed between Interest Rates and other columns</a:t>
+            </a:r>
+          </a:p>
+        </p:txBody>
+      </p:sp>
+    </p:spTree>
+    <p:extLst>
+      <p:ext uri="{BB962C8B-B14F-4D97-AF65-F5344CB8AC3E}">
+        <p14:creationId xmlns:p14="http://schemas.microsoft.com/office/powerpoint/2010/main" val="1756566596"/>
+      </p:ext>
+    </p:extLst>
+  </p:cSld>
+  <p:clrMapOvr>
+    <a:masterClrMapping/>
+  </p:clrMapOvr>
+</p:sld>
+</file>
+
+<file path=ppt/slides/slide5.xml><?xml version="1.0" encoding="utf-8"?>
+<p:sld xmlns:a="http://schemas.openxmlformats.org/drawingml/2006/main" xmlns:r="http://schemas.openxmlformats.org/officeDocument/2006/relationships" xmlns:p="http://schemas.openxmlformats.org/presentationml/2006/main">
+  <p:cSld>
+    <p:spTree>
+      <p:nvGrpSpPr>
+        <p:cNvPr id="1" name=""/>
+        <p:cNvGrpSpPr/>
+        <p:nvPr/>
+      </p:nvGrpSpPr>
+      <p:grpSpPr>
+        <a:xfrm>
+          <a:off x="0" y="0"/>
+          <a:ext cx="0" cy="0"/>
+          <a:chOff x="0" y="0"/>
+          <a:chExt cx="0" cy="0"/>
+        </a:xfrm>
+      </p:grpSpPr>
+      <p:sp>
+        <p:nvSpPr>
+          <p:cNvPr id="2" name="Title 1">
+            <a:extLst>
+              <a:ext uri="{FF2B5EF4-FFF2-40B4-BE49-F238E27FC236}">
+                <a16:creationId xmlns:a16="http://schemas.microsoft.com/office/drawing/2014/main" id="{ECEFC40D-61A4-5761-52DF-52A85CB99663}"/>
+              </a:ext>
+            </a:extLst>
+          </p:cNvPr>
+          <p:cNvSpPr>
+            <a:spLocks noGrp="1"/>
+          </p:cNvSpPr>
+          <p:nvPr>
+            <p:ph type="title"/>
+          </p:nvPr>
+        </p:nvSpPr>
+        <p:spPr/>
+        <p:txBody>
+          <a:bodyPr/>
+          <a:lstStyle/>
+          <a:p>
+            <a:pPr algn="ctr"/>
+            <a:r>
+              <a:rPr lang="en-US" dirty="0"/>
+              <a:t>Steps To Build Our Model</a:t>
+            </a:r>
+          </a:p>
+        </p:txBody>
+      </p:sp>
+      <p:sp>
+        <p:nvSpPr>
+          <p:cNvPr id="3" name="Content Placeholder 2">
+            <a:extLst>
+              <a:ext uri="{FF2B5EF4-FFF2-40B4-BE49-F238E27FC236}">
+                <a16:creationId xmlns:a16="http://schemas.microsoft.com/office/drawing/2014/main" id="{DBD804E5-4A82-D9E2-5D7F-A613182E5BFA}"/>
+              </a:ext>
+            </a:extLst>
+          </p:cNvPr>
+          <p:cNvSpPr>
+            <a:spLocks noGrp="1"/>
+          </p:cNvSpPr>
+          <p:nvPr>
+            <p:ph idx="1"/>
+          </p:nvPr>
+        </p:nvSpPr>
+        <p:spPr>
+          <a:xfrm>
+            <a:off x="1097280" y="2108201"/>
+            <a:ext cx="4674870" cy="3760891"/>
+          </a:xfrm>
+        </p:spPr>
+        <p:txBody>
+          <a:bodyPr/>
+          <a:lstStyle/>
+          <a:p>
+            <a:pPr marL="457200" indent="-457200">
+              <a:buFont typeface="+mj-lt"/>
+              <a:buAutoNum type="arabicParenR"/>
+            </a:pPr>
+            <a:r>
+              <a:rPr lang="en-US" dirty="0"/>
+              <a:t> Imported the dataset and displayed it to determine data type and features for the purpose of identifying </a:t>
+            </a:r>
+          </a:p>
+          <a:p>
+            <a:pPr marL="457200" indent="-457200">
+              <a:buFont typeface="+mj-lt"/>
+              <a:buAutoNum type="arabicParenR"/>
+            </a:pPr>
+            <a:r>
+              <a:rPr lang="en-US" dirty="0"/>
+              <a:t>Converted FICO score data from string to a numerical value for further analysis</a:t>
+            </a:r>
+          </a:p>
+          <a:p>
+            <a:pPr marL="457200" indent="-457200">
+              <a:buFont typeface="+mj-lt"/>
+              <a:buAutoNum type="arabicParenR"/>
+            </a:pPr>
+            <a:r>
+              <a:rPr lang="en-US" dirty="0"/>
+              <a:t>Split the data into testing and train sets </a:t>
+            </a:r>
+          </a:p>
+          <a:p>
+            <a:pPr marL="457200" indent="-457200">
+              <a:buFont typeface="+mj-lt"/>
+              <a:buAutoNum type="arabicParenR"/>
+            </a:pPr>
+            <a:r>
+              <a:rPr lang="en-US" dirty="0"/>
+              <a:t>Constructed a linear regression model</a:t>
+            </a:r>
+          </a:p>
+          <a:p>
+            <a:pPr marL="457200" indent="-457200">
+              <a:buFont typeface="+mj-lt"/>
+              <a:buAutoNum type="arabicParenR"/>
+            </a:pPr>
+            <a:r>
+              <a:rPr lang="en-US" dirty="0"/>
+              <a:t>Fit the model to the training set in order to train the training set </a:t>
+            </a:r>
+          </a:p>
+          <a:p>
+            <a:pPr>
+              <a:buFont typeface="Wingdings" panose="05000000000000000000" pitchFamily="2" charset="2"/>
+              <a:buChar char="Ø"/>
+            </a:pPr>
+            <a:endParaRPr lang="en-US" dirty="0"/>
+          </a:p>
+          <a:p>
+            <a:pPr>
+              <a:buFont typeface="Wingdings" panose="05000000000000000000" pitchFamily="2" charset="2"/>
+              <a:buChar char="Ø"/>
+            </a:pPr>
+            <a:endParaRPr lang="en-US" dirty="0"/>
+          </a:p>
+        </p:txBody>
+      </p:sp>
+      <p:pic>
+        <p:nvPicPr>
+          <p:cNvPr id="5" name="Picture 4" descr="Chart, scatter chart&#10;&#10;Description automatically generated">
+            <a:extLst>
+              <a:ext uri="{FF2B5EF4-FFF2-40B4-BE49-F238E27FC236}">
+                <a16:creationId xmlns:a16="http://schemas.microsoft.com/office/drawing/2014/main" id="{2DF02223-0B78-58EA-D155-A24EFC0FA896}"/>
+              </a:ext>
+            </a:extLst>
+          </p:cNvPr>
+          <p:cNvPicPr>
+            <a:picLocks noChangeAspect="1"/>
+          </p:cNvPicPr>
+          <p:nvPr/>
+        </p:nvPicPr>
+        <p:blipFill>
+          <a:blip r:embed="rId2">
+            <a:extLst>
+              <a:ext uri="{28A0092B-C50C-407E-A947-70E740481C1C}">
+                <a14:useLocalDpi xmlns:a14="http://schemas.microsoft.com/office/drawing/2010/main" val="0"/>
+              </a:ext>
+            </a:extLst>
+          </a:blip>
+          <a:stretch>
+            <a:fillRect/>
+          </a:stretch>
+        </p:blipFill>
+        <p:spPr>
+          <a:xfrm>
+            <a:off x="0" y="1013526"/>
+            <a:ext cx="12192000" cy="4830947"/>
+          </a:xfrm>
+          <a:prstGeom prst="rect">
+            <a:avLst/>
+          </a:prstGeom>
+        </p:spPr>
+      </p:pic>
+    </p:spTree>
+    <p:extLst>
+      <p:ext uri="{BB962C8B-B14F-4D97-AF65-F5344CB8AC3E}">
+        <p14:creationId xmlns:p14="http://schemas.microsoft.com/office/powerpoint/2010/main" val="185423212"/>
+      </p:ext>
+    </p:extLst>
+  </p:cSld>
+  <p:clrMapOvr>
+    <a:masterClrMapping/>
+  </p:clrMapOvr>
+</p:sld>
+</file>
+
+<file path=ppt/slides/slide6.xml><?xml version="1.0" encoding="utf-8"?>
 <p:sld xmlns:a="http://schemas.openxmlformats.org/drawingml/2006/main" xmlns:r="http://schemas.openxmlformats.org/officeDocument/2006/relationships" xmlns:p="http://schemas.openxmlformats.org/presentationml/2006/main">
   <p:cSld>
     <p:bg>
@@ -4647,12 +5308,23 @@
 </file>
 
 <file path=customXml/item1.xml><?xml version="1.0" encoding="utf-8"?>
-<?mso-contentType ?>
-<FormTemplates xmlns="http://schemas.microsoft.com/sharepoint/v3/contenttype/forms">
-  <Display>DocumentLibraryForm</Display>
-  <Edit>DocumentLibraryForm</Edit>
-  <New>DocumentLibraryForm</New>
-</FormTemplates>
+<p:properties xmlns:p="http://schemas.microsoft.com/office/2006/metadata/properties" xmlns:xsi="http://www.w3.org/2001/XMLSchema-instance" xmlns:pc="http://schemas.microsoft.com/office/infopath/2007/PartnerControls">
+  <documentManagement>
+    <_ip_UnifiedCompliancePolicyUIAction xmlns="http://schemas.microsoft.com/sharepoint/v3" xsi:nil="true"/>
+    <Image xmlns="71af3243-3dd4-4a8d-8c0d-dd76da1f02a5">
+      <Url xsi:nil="true"/>
+      <Description xsi:nil="true"/>
+    </Image>
+    <Status xmlns="71af3243-3dd4-4a8d-8c0d-dd76da1f02a5">Not started</Status>
+    <Background xmlns="71af3243-3dd4-4a8d-8c0d-dd76da1f02a5">false</Background>
+    <_ip_UnifiedCompliancePolicyProperties xmlns="http://schemas.microsoft.com/sharepoint/v3" xsi:nil="true"/>
+    <ImageTagsTaxHTField xmlns="71af3243-3dd4-4a8d-8c0d-dd76da1f02a5">
+      <Terms xmlns="http://schemas.microsoft.com/office/infopath/2007/PartnerControls"/>
+    </ImageTagsTaxHTField>
+    <TaxCatchAll xmlns="230e9df3-be65-4c73-a93b-d1236ebd677e" xsi:nil="true"/>
+    <MediaServiceKeyPoints xmlns="71af3243-3dd4-4a8d-8c0d-dd76da1f02a5" xsi:nil="true"/>
+  </documentManagement>
+</p:properties>
 </file>
 
 <file path=customXml/item2.xml><?xml version="1.0" encoding="utf-8"?>
@@ -4962,29 +5634,22 @@
 </file>
 
 <file path=customXml/item3.xml><?xml version="1.0" encoding="utf-8"?>
-<p:properties xmlns:p="http://schemas.microsoft.com/office/2006/metadata/properties" xmlns:xsi="http://www.w3.org/2001/XMLSchema-instance" xmlns:pc="http://schemas.microsoft.com/office/infopath/2007/PartnerControls">
-  <documentManagement>
-    <_ip_UnifiedCompliancePolicyUIAction xmlns="http://schemas.microsoft.com/sharepoint/v3" xsi:nil="true"/>
-    <Image xmlns="71af3243-3dd4-4a8d-8c0d-dd76da1f02a5">
-      <Url xsi:nil="true"/>
-      <Description xsi:nil="true"/>
-    </Image>
-    <Status xmlns="71af3243-3dd4-4a8d-8c0d-dd76da1f02a5">Not started</Status>
-    <Background xmlns="71af3243-3dd4-4a8d-8c0d-dd76da1f02a5">false</Background>
-    <_ip_UnifiedCompliancePolicyProperties xmlns="http://schemas.microsoft.com/sharepoint/v3" xsi:nil="true"/>
-    <ImageTagsTaxHTField xmlns="71af3243-3dd4-4a8d-8c0d-dd76da1f02a5">
-      <Terms xmlns="http://schemas.microsoft.com/office/infopath/2007/PartnerControls"/>
-    </ImageTagsTaxHTField>
-    <TaxCatchAll xmlns="230e9df3-be65-4c73-a93b-d1236ebd677e" xsi:nil="true"/>
-    <MediaServiceKeyPoints xmlns="71af3243-3dd4-4a8d-8c0d-dd76da1f02a5" xsi:nil="true"/>
-  </documentManagement>
-</p:properties>
+<?mso-contentType ?>
+<FormTemplates xmlns="http://schemas.microsoft.com/sharepoint/v3/contenttype/forms">
+  <Display>DocumentLibraryForm</Display>
+  <Edit>DocumentLibraryForm</Edit>
+  <New>DocumentLibraryForm</New>
+</FormTemplates>
 </file>
 
 <file path=customXml/itemProps1.xml><?xml version="1.0" encoding="utf-8"?>
-<ds:datastoreItem xmlns:ds="http://schemas.openxmlformats.org/officeDocument/2006/customXml" ds:itemID="{19DAD249-BF80-48EF-9AFB-36A11BCDC2CE}">
+<ds:datastoreItem xmlns:ds="http://schemas.openxmlformats.org/officeDocument/2006/customXml" ds:itemID="{6F4F4D41-822D-40F2-A7AC-E4E6CB36CA7A}">
   <ds:schemaRefs>
-    <ds:schemaRef ds:uri="http://schemas.microsoft.com/sharepoint/v3/contenttype/forms"/>
+    <ds:schemaRef ds:uri="http://schemas.microsoft.com/office/2006/metadata/properties"/>
+    <ds:schemaRef ds:uri="http://schemas.microsoft.com/office/infopath/2007/PartnerControls"/>
+    <ds:schemaRef ds:uri="http://schemas.microsoft.com/sharepoint/v3"/>
+    <ds:schemaRef ds:uri="71af3243-3dd4-4a8d-8c0d-dd76da1f02a5"/>
+    <ds:schemaRef ds:uri="230e9df3-be65-4c73-a93b-d1236ebd677e"/>
   </ds:schemaRefs>
 </ds:datastoreItem>
 </file>
@@ -5011,13 +5676,9 @@
 </file>
 
 <file path=customXml/itemProps3.xml><?xml version="1.0" encoding="utf-8"?>
-<ds:datastoreItem xmlns:ds="http://schemas.openxmlformats.org/officeDocument/2006/customXml" ds:itemID="{6F4F4D41-822D-40F2-A7AC-E4E6CB36CA7A}">
+<ds:datastoreItem xmlns:ds="http://schemas.openxmlformats.org/officeDocument/2006/customXml" ds:itemID="{19DAD249-BF80-48EF-9AFB-36A11BCDC2CE}">
   <ds:schemaRefs>
-    <ds:schemaRef ds:uri="http://schemas.microsoft.com/office/2006/metadata/properties"/>
-    <ds:schemaRef ds:uri="http://schemas.microsoft.com/office/infopath/2007/PartnerControls"/>
-    <ds:schemaRef ds:uri="http://schemas.microsoft.com/sharepoint/v3"/>
-    <ds:schemaRef ds:uri="71af3243-3dd4-4a8d-8c0d-dd76da1f02a5"/>
-    <ds:schemaRef ds:uri="230e9df3-be65-4c73-a93b-d1236ebd677e"/>
+    <ds:schemaRef ds:uri="http://schemas.microsoft.com/sharepoint/v3/contenttype/forms"/>
   </ds:schemaRefs>
 </ds:datastoreItem>
 </file>
</xml_diff>